<commit_message>
Updated PPT & new images
Downloaded open source samples from flickr
Updated PPT for SBU presentation
</commit_message>
<xml_diff>
--- a/Presentation/Project Proposal Great Wall.pptx
+++ b/Presentation/Project Proposal Great Wall.pptx
@@ -6,6 +6,9 @@
   </p:sldMasterIdLst>
   <p:sldIdLst>
     <p:sldId id="256" r:id="rId2"/>
+    <p:sldId id="262" r:id="rId3"/>
+    <p:sldId id="257" r:id="rId4"/>
+    <p:sldId id="258" r:id="rId5"/>
   </p:sldIdLst>
   <p:sldSz cx="9144000" cy="6858000" type="screen4x3"/>
   <p:notesSz cx="6858000" cy="9144000"/>
@@ -3466,6 +3469,642 @@
 </p:sld>
 </file>
 
+<file path=ppt/slides/slide2.xml><?xml version="1.0" encoding="utf-8"?>
+<p:sld xmlns:a="http://schemas.openxmlformats.org/drawingml/2006/main" xmlns:r="http://schemas.openxmlformats.org/officeDocument/2006/relationships" xmlns:p="http://schemas.openxmlformats.org/presentationml/2006/main">
+  <p:cSld>
+    <p:spTree>
+      <p:nvGrpSpPr>
+        <p:cNvPr id="1" name=""/>
+        <p:cNvGrpSpPr/>
+        <p:nvPr/>
+      </p:nvGrpSpPr>
+      <p:grpSpPr>
+        <a:xfrm>
+          <a:off x="0" y="0"/>
+          <a:ext cx="0" cy="0"/>
+          <a:chOff x="0" y="0"/>
+          <a:chExt cx="0" cy="0"/>
+        </a:xfrm>
+      </p:grpSpPr>
+      <p:sp>
+        <p:nvSpPr>
+          <p:cNvPr id="2" name="Title 1"/>
+          <p:cNvSpPr>
+            <a:spLocks noGrp="1"/>
+          </p:cNvSpPr>
+          <p:nvPr>
+            <p:ph type="title"/>
+          </p:nvPr>
+        </p:nvSpPr>
+        <p:spPr/>
+        <p:txBody>
+          <a:bodyPr/>
+          <a:lstStyle/>
+          <a:p>
+            <a:r>
+              <a:rPr lang="en-US" dirty="0" smtClean="0"/>
+              <a:t>Tourism Types</a:t>
+            </a:r>
+            <a:endParaRPr lang="en-US" dirty="0"/>
+          </a:p>
+        </p:txBody>
+      </p:sp>
+      <p:sp>
+        <p:nvSpPr>
+          <p:cNvPr id="3" name="Text Placeholder 2"/>
+          <p:cNvSpPr>
+            <a:spLocks noGrp="1"/>
+          </p:cNvSpPr>
+          <p:nvPr>
+            <p:ph type="body" idx="1"/>
+          </p:nvPr>
+        </p:nvSpPr>
+        <p:spPr/>
+        <p:txBody>
+          <a:bodyPr/>
+          <a:lstStyle/>
+          <a:p>
+            <a:r>
+              <a:rPr lang="en-US" dirty="0" smtClean="0"/>
+              <a:t>Inward Tourism</a:t>
+            </a:r>
+            <a:endParaRPr lang="en-US" dirty="0"/>
+          </a:p>
+        </p:txBody>
+      </p:sp>
+      <p:sp>
+        <p:nvSpPr>
+          <p:cNvPr id="4" name="Content Placeholder 3"/>
+          <p:cNvSpPr>
+            <a:spLocks noGrp="1"/>
+          </p:cNvSpPr>
+          <p:nvPr>
+            <p:ph sz="half" idx="2"/>
+          </p:nvPr>
+        </p:nvSpPr>
+        <p:spPr/>
+        <p:txBody>
+          <a:bodyPr/>
+          <a:lstStyle/>
+          <a:p>
+            <a:r>
+              <a:rPr lang="en-US" dirty="0"/>
+              <a:t>A</a:t>
+            </a:r>
+            <a:r>
+              <a:rPr lang="en-US" dirty="0" smtClean="0"/>
+              <a:t> Single object </a:t>
+            </a:r>
+          </a:p>
+          <a:p>
+            <a:r>
+              <a:rPr lang="en-US" dirty="0" smtClean="0"/>
+              <a:t>Photographed </a:t>
+            </a:r>
+            <a:r>
+              <a:rPr lang="en-US" i="1" dirty="0" smtClean="0"/>
+              <a:t>inward</a:t>
+            </a:r>
+            <a:r>
+              <a:rPr lang="en-US" dirty="0" smtClean="0"/>
+              <a:t> about an object</a:t>
+            </a:r>
+          </a:p>
+          <a:p>
+            <a:r>
+              <a:rPr lang="en-US" dirty="0" smtClean="0"/>
+              <a:t>Examples</a:t>
+            </a:r>
+          </a:p>
+          <a:p>
+            <a:pPr lvl="1"/>
+            <a:r>
+              <a:rPr lang="en-US" dirty="0" smtClean="0"/>
+              <a:t>Fountains</a:t>
+            </a:r>
+          </a:p>
+          <a:p>
+            <a:pPr lvl="1"/>
+            <a:r>
+              <a:rPr lang="en-US" dirty="0" smtClean="0"/>
+              <a:t>Buildings</a:t>
+            </a:r>
+          </a:p>
+          <a:p>
+            <a:pPr lvl="1"/>
+            <a:r>
+              <a:rPr lang="en-US" dirty="0" smtClean="0"/>
+              <a:t>Architecture</a:t>
+            </a:r>
+          </a:p>
+          <a:p>
+            <a:pPr lvl="1"/>
+            <a:endParaRPr lang="en-US" dirty="0" smtClean="0"/>
+          </a:p>
+        </p:txBody>
+      </p:sp>
+      <p:sp>
+        <p:nvSpPr>
+          <p:cNvPr id="5" name="Text Placeholder 4"/>
+          <p:cNvSpPr>
+            <a:spLocks noGrp="1"/>
+          </p:cNvSpPr>
+          <p:nvPr>
+            <p:ph type="body" sz="quarter" idx="3"/>
+          </p:nvPr>
+        </p:nvSpPr>
+        <p:spPr/>
+        <p:txBody>
+          <a:bodyPr/>
+          <a:lstStyle/>
+          <a:p>
+            <a:r>
+              <a:rPr lang="en-US" dirty="0" smtClean="0"/>
+              <a:t>Outward Tourism</a:t>
+            </a:r>
+            <a:endParaRPr lang="en-US" dirty="0"/>
+          </a:p>
+        </p:txBody>
+      </p:sp>
+      <p:sp>
+        <p:nvSpPr>
+          <p:cNvPr id="6" name="Content Placeholder 5"/>
+          <p:cNvSpPr>
+            <a:spLocks noGrp="1"/>
+          </p:cNvSpPr>
+          <p:nvPr>
+            <p:ph sz="quarter" idx="4"/>
+          </p:nvPr>
+        </p:nvSpPr>
+        <p:spPr/>
+        <p:txBody>
+          <a:bodyPr/>
+          <a:lstStyle/>
+          <a:p>
+            <a:r>
+              <a:rPr lang="en-US" dirty="0" smtClean="0"/>
+              <a:t>Many Objects</a:t>
+            </a:r>
+          </a:p>
+          <a:p>
+            <a:r>
+              <a:rPr lang="en-US" dirty="0" smtClean="0"/>
+              <a:t>Photographing </a:t>
+            </a:r>
+            <a:r>
+              <a:rPr lang="en-US" i="1" dirty="0" smtClean="0"/>
+              <a:t>outward</a:t>
+            </a:r>
+            <a:r>
+              <a:rPr lang="en-US" dirty="0" smtClean="0"/>
+              <a:t> around a point</a:t>
+            </a:r>
+          </a:p>
+          <a:p>
+            <a:r>
+              <a:rPr lang="en-US" dirty="0" smtClean="0"/>
+              <a:t>Examples</a:t>
+            </a:r>
+          </a:p>
+          <a:p>
+            <a:pPr lvl="1"/>
+            <a:r>
+              <a:rPr lang="en-US" dirty="0" smtClean="0"/>
+              <a:t>Town Squares</a:t>
+            </a:r>
+          </a:p>
+          <a:p>
+            <a:pPr lvl="1"/>
+            <a:r>
+              <a:rPr lang="en-US" dirty="0" smtClean="0"/>
+              <a:t>Rooms / Halls</a:t>
+            </a:r>
+          </a:p>
+          <a:p>
+            <a:pPr lvl="1"/>
+            <a:r>
+              <a:rPr lang="en-US" dirty="0" err="1" smtClean="0"/>
+              <a:t>Panaramic</a:t>
+            </a:r>
+            <a:endParaRPr lang="en-US" dirty="0"/>
+          </a:p>
+        </p:txBody>
+      </p:sp>
+    </p:spTree>
+    <p:extLst>
+      <p:ext uri="{BB962C8B-B14F-4D97-AF65-F5344CB8AC3E}">
+        <p14:creationId xmlns:p14="http://schemas.microsoft.com/office/powerpoint/2010/main" val="2603691307"/>
+      </p:ext>
+    </p:extLst>
+  </p:cSld>
+  <p:clrMapOvr>
+    <a:masterClrMapping/>
+  </p:clrMapOvr>
+</p:sld>
+</file>
+
+<file path=ppt/slides/slide3.xml><?xml version="1.0" encoding="utf-8"?>
+<p:sld xmlns:a="http://schemas.openxmlformats.org/drawingml/2006/main" xmlns:r="http://schemas.openxmlformats.org/officeDocument/2006/relationships" xmlns:p="http://schemas.openxmlformats.org/presentationml/2006/main">
+  <p:cSld>
+    <p:spTree>
+      <p:nvGrpSpPr>
+        <p:cNvPr id="1" name=""/>
+        <p:cNvGrpSpPr/>
+        <p:nvPr/>
+      </p:nvGrpSpPr>
+      <p:grpSpPr>
+        <a:xfrm>
+          <a:off x="0" y="0"/>
+          <a:ext cx="0" cy="0"/>
+          <a:chOff x="0" y="0"/>
+          <a:chExt cx="0" cy="0"/>
+        </a:xfrm>
+      </p:grpSpPr>
+      <p:sp>
+        <p:nvSpPr>
+          <p:cNvPr id="2" name="Title 1"/>
+          <p:cNvSpPr>
+            <a:spLocks noGrp="1"/>
+          </p:cNvSpPr>
+          <p:nvPr>
+            <p:ph type="title"/>
+          </p:nvPr>
+        </p:nvSpPr>
+        <p:spPr/>
+        <p:txBody>
+          <a:bodyPr/>
+          <a:lstStyle/>
+          <a:p>
+            <a:r>
+              <a:rPr lang="en-US" dirty="0" smtClean="0"/>
+              <a:t>Stony Brook University</a:t>
+            </a:r>
+            <a:endParaRPr lang="en-US" dirty="0"/>
+          </a:p>
+        </p:txBody>
+      </p:sp>
+      <p:pic>
+        <p:nvPicPr>
+          <p:cNvPr id="4" name="Content Placeholder 3"/>
+          <p:cNvPicPr>
+            <a:picLocks noGrp="1" noChangeAspect="1"/>
+          </p:cNvPicPr>
+          <p:nvPr>
+            <p:ph idx="1"/>
+          </p:nvPr>
+        </p:nvPicPr>
+        <p:blipFill>
+          <a:blip r:embed="rId2">
+            <a:extLst>
+              <a:ext uri="{28A0092B-C50C-407E-A947-70E740481C1C}">
+                <a14:useLocalDpi xmlns:a14="http://schemas.microsoft.com/office/drawing/2010/main" val="0"/>
+              </a:ext>
+            </a:extLst>
+          </a:blip>
+          <a:stretch>
+            <a:fillRect/>
+          </a:stretch>
+        </p:blipFill>
+        <p:spPr>
+          <a:xfrm>
+            <a:off x="762000" y="1881981"/>
+            <a:ext cx="7620000" cy="3962400"/>
+          </a:xfrm>
+        </p:spPr>
+      </p:pic>
+    </p:spTree>
+    <p:extLst>
+      <p:ext uri="{BB962C8B-B14F-4D97-AF65-F5344CB8AC3E}">
+        <p14:creationId xmlns:p14="http://schemas.microsoft.com/office/powerpoint/2010/main" val="1798702378"/>
+      </p:ext>
+    </p:extLst>
+  </p:cSld>
+  <p:clrMapOvr>
+    <a:masterClrMapping/>
+  </p:clrMapOvr>
+  <p:timing>
+    <p:tnLst>
+      <p:par>
+        <p:cTn id="1" dur="indefinite" restart="never" nodeType="tmRoot"/>
+      </p:par>
+    </p:tnLst>
+  </p:timing>
+</p:sld>
+</file>
+
+<file path=ppt/slides/slide4.xml><?xml version="1.0" encoding="utf-8"?>
+<p:sld xmlns:a="http://schemas.openxmlformats.org/drawingml/2006/main" xmlns:r="http://schemas.openxmlformats.org/officeDocument/2006/relationships" xmlns:p="http://schemas.openxmlformats.org/presentationml/2006/main">
+  <p:cSld>
+    <p:spTree>
+      <p:nvGrpSpPr>
+        <p:cNvPr id="1" name=""/>
+        <p:cNvGrpSpPr/>
+        <p:nvPr/>
+      </p:nvGrpSpPr>
+      <p:grpSpPr>
+        <a:xfrm>
+          <a:off x="0" y="0"/>
+          <a:ext cx="0" cy="0"/>
+          <a:chOff x="0" y="0"/>
+          <a:chExt cx="0" cy="0"/>
+        </a:xfrm>
+      </p:grpSpPr>
+      <p:sp>
+        <p:nvSpPr>
+          <p:cNvPr id="2" name="Title 1"/>
+          <p:cNvSpPr>
+            <a:spLocks noGrp="1"/>
+          </p:cNvSpPr>
+          <p:nvPr>
+            <p:ph type="title"/>
+          </p:nvPr>
+        </p:nvSpPr>
+        <p:spPr>
+          <a:xfrm>
+            <a:off x="457200" y="274638"/>
+            <a:ext cx="8229600" cy="2087562"/>
+          </a:xfrm>
+        </p:spPr>
+        <p:txBody>
+          <a:bodyPr>
+            <a:normAutofit/>
+          </a:bodyPr>
+          <a:lstStyle/>
+          <a:p>
+            <a:r>
+              <a:rPr lang="en-US" dirty="0" smtClean="0"/>
+              <a:t>Stony Brook</a:t>
+            </a:r>
+            <a:br>
+              <a:rPr lang="en-US" dirty="0" smtClean="0"/>
+            </a:br>
+            <a:r>
+              <a:rPr lang="en-US" dirty="0" smtClean="0"/>
+              <a:t>Virtual Tour</a:t>
+            </a:r>
+            <a:endParaRPr lang="en-US" dirty="0"/>
+          </a:p>
+        </p:txBody>
+      </p:sp>
+      <p:pic>
+        <p:nvPicPr>
+          <p:cNvPr id="4" name="Picture 3"/>
+          <p:cNvPicPr>
+            <a:picLocks noChangeAspect="1"/>
+          </p:cNvPicPr>
+          <p:nvPr/>
+        </p:nvPicPr>
+        <p:blipFill>
+          <a:blip r:embed="rId2" cstate="print">
+            <a:extLst>
+              <a:ext uri="{28A0092B-C50C-407E-A947-70E740481C1C}">
+                <a14:useLocalDpi xmlns:a14="http://schemas.microsoft.com/office/drawing/2010/main" val="0"/>
+              </a:ext>
+            </a:extLst>
+          </a:blip>
+          <a:stretch>
+            <a:fillRect/>
+          </a:stretch>
+        </p:blipFill>
+        <p:spPr>
+          <a:xfrm>
+            <a:off x="228600" y="318655"/>
+            <a:ext cx="2438400" cy="1828800"/>
+          </a:xfrm>
+          <a:prstGeom prst="rect">
+            <a:avLst/>
+          </a:prstGeom>
+        </p:spPr>
+      </p:pic>
+      <p:pic>
+        <p:nvPicPr>
+          <p:cNvPr id="5" name="Picture 4"/>
+          <p:cNvPicPr>
+            <a:picLocks noChangeAspect="1"/>
+          </p:cNvPicPr>
+          <p:nvPr/>
+        </p:nvPicPr>
+        <p:blipFill>
+          <a:blip r:embed="rId3" cstate="print">
+            <a:extLst>
+              <a:ext uri="{28A0092B-C50C-407E-A947-70E740481C1C}">
+                <a14:useLocalDpi xmlns:a14="http://schemas.microsoft.com/office/drawing/2010/main" val="0"/>
+              </a:ext>
+            </a:extLst>
+          </a:blip>
+          <a:stretch>
+            <a:fillRect/>
+          </a:stretch>
+        </p:blipFill>
+        <p:spPr>
+          <a:xfrm>
+            <a:off x="305692" y="2646218"/>
+            <a:ext cx="2284215" cy="1828800"/>
+          </a:xfrm>
+          <a:prstGeom prst="rect">
+            <a:avLst/>
+          </a:prstGeom>
+        </p:spPr>
+      </p:pic>
+      <p:pic>
+        <p:nvPicPr>
+          <p:cNvPr id="7" name="Picture 6"/>
+          <p:cNvPicPr>
+            <a:picLocks noChangeAspect="1"/>
+          </p:cNvPicPr>
+          <p:nvPr/>
+        </p:nvPicPr>
+        <p:blipFill>
+          <a:blip r:embed="rId4">
+            <a:extLst>
+              <a:ext uri="{28A0092B-C50C-407E-A947-70E740481C1C}">
+                <a14:useLocalDpi xmlns:a14="http://schemas.microsoft.com/office/drawing/2010/main" val="0"/>
+              </a:ext>
+            </a:extLst>
+          </a:blip>
+          <a:stretch>
+            <a:fillRect/>
+          </a:stretch>
+        </p:blipFill>
+        <p:spPr>
+          <a:xfrm>
+            <a:off x="3047999" y="2646218"/>
+            <a:ext cx="3002507" cy="1828800"/>
+          </a:xfrm>
+          <a:prstGeom prst="rect">
+            <a:avLst/>
+          </a:prstGeom>
+        </p:spPr>
+      </p:pic>
+      <p:pic>
+        <p:nvPicPr>
+          <p:cNvPr id="8" name="Picture 7"/>
+          <p:cNvPicPr>
+            <a:picLocks noChangeAspect="1"/>
+          </p:cNvPicPr>
+          <p:nvPr/>
+        </p:nvPicPr>
+        <p:blipFill>
+          <a:blip r:embed="rId5" cstate="print">
+            <a:extLst>
+              <a:ext uri="{28A0092B-C50C-407E-A947-70E740481C1C}">
+                <a14:useLocalDpi xmlns:a14="http://schemas.microsoft.com/office/drawing/2010/main" val="0"/>
+              </a:ext>
+            </a:extLst>
+          </a:blip>
+          <a:stretch>
+            <a:fillRect/>
+          </a:stretch>
+        </p:blipFill>
+        <p:spPr>
+          <a:xfrm>
+            <a:off x="6248400" y="263650"/>
+            <a:ext cx="2743200" cy="1828800"/>
+          </a:xfrm>
+          <a:prstGeom prst="rect">
+            <a:avLst/>
+          </a:prstGeom>
+        </p:spPr>
+      </p:pic>
+      <p:pic>
+        <p:nvPicPr>
+          <p:cNvPr id="9" name="Picture 8"/>
+          <p:cNvPicPr>
+            <a:picLocks noChangeAspect="1"/>
+          </p:cNvPicPr>
+          <p:nvPr/>
+        </p:nvPicPr>
+        <p:blipFill rotWithShape="1">
+          <a:blip r:embed="rId6" cstate="print">
+            <a:extLst>
+              <a:ext uri="{28A0092B-C50C-407E-A947-70E740481C1C}">
+                <a14:useLocalDpi xmlns:a14="http://schemas.microsoft.com/office/drawing/2010/main" val="0"/>
+              </a:ext>
+            </a:extLst>
+          </a:blip>
+          <a:srcRect l="12560" r="12560"/>
+          <a:stretch/>
+        </p:blipFill>
+        <p:spPr>
+          <a:xfrm>
+            <a:off x="228600" y="4876800"/>
+            <a:ext cx="2438400" cy="1828800"/>
+          </a:xfrm>
+          <a:prstGeom prst="rect">
+            <a:avLst/>
+          </a:prstGeom>
+        </p:spPr>
+      </p:pic>
+      <p:pic>
+        <p:nvPicPr>
+          <p:cNvPr id="10" name="Picture 9"/>
+          <p:cNvPicPr>
+            <a:picLocks noChangeAspect="1"/>
+          </p:cNvPicPr>
+          <p:nvPr/>
+        </p:nvPicPr>
+        <p:blipFill>
+          <a:blip r:embed="rId7">
+            <a:extLst>
+              <a:ext uri="{28A0092B-C50C-407E-A947-70E740481C1C}">
+                <a14:useLocalDpi xmlns:a14="http://schemas.microsoft.com/office/drawing/2010/main" val="0"/>
+              </a:ext>
+            </a:extLst>
+          </a:blip>
+          <a:stretch>
+            <a:fillRect/>
+          </a:stretch>
+        </p:blipFill>
+        <p:spPr>
+          <a:xfrm>
+            <a:off x="3176279" y="4876800"/>
+            <a:ext cx="2745946" cy="1828800"/>
+          </a:xfrm>
+          <a:prstGeom prst="rect">
+            <a:avLst/>
+          </a:prstGeom>
+        </p:spPr>
+      </p:pic>
+      <p:pic>
+        <p:nvPicPr>
+          <p:cNvPr id="11" name="Picture 10"/>
+          <p:cNvPicPr>
+            <a:picLocks noChangeAspect="1"/>
+          </p:cNvPicPr>
+          <p:nvPr/>
+        </p:nvPicPr>
+        <p:blipFill>
+          <a:blip r:embed="rId8">
+            <a:extLst>
+              <a:ext uri="{28A0092B-C50C-407E-A947-70E740481C1C}">
+                <a14:useLocalDpi xmlns:a14="http://schemas.microsoft.com/office/drawing/2010/main" val="0"/>
+              </a:ext>
+            </a:extLst>
+          </a:blip>
+          <a:stretch>
+            <a:fillRect/>
+          </a:stretch>
+        </p:blipFill>
+        <p:spPr>
+          <a:xfrm>
+            <a:off x="6400800" y="2646218"/>
+            <a:ext cx="2438400" cy="1828800"/>
+          </a:xfrm>
+          <a:prstGeom prst="rect">
+            <a:avLst/>
+          </a:prstGeom>
+        </p:spPr>
+      </p:pic>
+      <p:pic>
+        <p:nvPicPr>
+          <p:cNvPr id="6" name="Picture 5"/>
+          <p:cNvPicPr>
+            <a:picLocks noChangeAspect="1"/>
+          </p:cNvPicPr>
+          <p:nvPr/>
+        </p:nvPicPr>
+        <p:blipFill>
+          <a:blip r:embed="rId9">
+            <a:extLst>
+              <a:ext uri="{28A0092B-C50C-407E-A947-70E740481C1C}">
+                <a14:useLocalDpi xmlns:a14="http://schemas.microsoft.com/office/drawing/2010/main" val="0"/>
+              </a:ext>
+            </a:extLst>
+          </a:blip>
+          <a:stretch>
+            <a:fillRect/>
+          </a:stretch>
+        </p:blipFill>
+        <p:spPr>
+          <a:xfrm>
+            <a:off x="6400800" y="4876800"/>
+            <a:ext cx="2438400" cy="1828800"/>
+          </a:xfrm>
+          <a:prstGeom prst="rect">
+            <a:avLst/>
+          </a:prstGeom>
+        </p:spPr>
+      </p:pic>
+    </p:spTree>
+    <p:extLst>
+      <p:ext uri="{BB962C8B-B14F-4D97-AF65-F5344CB8AC3E}">
+        <p14:creationId xmlns:p14="http://schemas.microsoft.com/office/powerpoint/2010/main" val="2916416772"/>
+      </p:ext>
+    </p:extLst>
+  </p:cSld>
+  <p:clrMapOvr>
+    <a:masterClrMapping/>
+  </p:clrMapOvr>
+  <p:timing>
+    <p:tnLst>
+      <p:par>
+        <p:cTn id="1" dur="indefinite" restart="never" nodeType="tmRoot"/>
+      </p:par>
+    </p:tnLst>
+  </p:timing>
+</p:sld>
+</file>
+
 <file path=ppt/theme/theme1.xml><?xml version="1.0" encoding="utf-8"?>
 <a:theme xmlns:a="http://schemas.openxmlformats.org/drawingml/2006/main" name="Office Theme">
   <a:themeElements>

</xml_diff>